<commit_message>
aggiornato il file doc/interfaccia.pptx
</commit_message>
<xml_diff>
--- a/doc/interfaccia.pptx
+++ b/doc/interfaccia.pptx
@@ -6,9 +6,11 @@
   </p:sldMasterIdLst>
   <p:sldIdLst>
     <p:sldId id="258" r:id="rId2"/>
-    <p:sldId id="256" r:id="rId3"/>
-    <p:sldId id="257" r:id="rId4"/>
-    <p:sldId id="259" r:id="rId5"/>
+    <p:sldId id="261" r:id="rId3"/>
+    <p:sldId id="260" r:id="rId4"/>
+    <p:sldId id="256" r:id="rId5"/>
+    <p:sldId id="257" r:id="rId6"/>
+    <p:sldId id="259" r:id="rId7"/>
   </p:sldIdLst>
   <p:sldSz cx="12192000" cy="6858000"/>
   <p:notesSz cx="6858000" cy="9144000"/>
@@ -3368,7 +3370,7 @@
         </p:nvSpPr>
         <p:spPr>
           <a:xfrm>
-            <a:off x="1524000" y="1122363"/>
+            <a:off x="1185672" y="686848"/>
             <a:ext cx="6394704" cy="871029"/>
           </a:xfrm>
         </p:spPr>
@@ -3389,57 +3391,104 @@
       </p:sp>
       <p:sp>
         <p:nvSpPr>
-          <p:cNvPr id="3" name="Subtitle 2">
-            <a:extLst>
-              <a:ext uri="{FF2B5EF4-FFF2-40B4-BE49-F238E27FC236}">
-                <a16:creationId xmlns:a16="http://schemas.microsoft.com/office/drawing/2014/main" id="{7E532D42-5EFB-4F3F-8DB1-D583884E9856}"/>
-              </a:ext>
-            </a:extLst>
-          </p:cNvPr>
-          <p:cNvSpPr>
-            <a:spLocks noGrp="1"/>
-          </p:cNvSpPr>
-          <p:nvPr>
-            <p:ph type="subTitle" idx="1"/>
-          </p:nvPr>
-        </p:nvSpPr>
-        <p:spPr>
-          <a:xfrm>
-            <a:off x="1463040" y="2425510"/>
-            <a:ext cx="9144000" cy="1655762"/>
-          </a:xfrm>
-        </p:spPr>
-        <p:txBody>
-          <a:bodyPr>
-            <a:normAutofit fontScale="70000" lnSpcReduction="20000"/>
+          <p:cNvPr id="5" name="TextBox 4">
+            <a:extLst>
+              <a:ext uri="{FF2B5EF4-FFF2-40B4-BE49-F238E27FC236}">
+                <a16:creationId xmlns:a16="http://schemas.microsoft.com/office/drawing/2014/main" id="{1D3E2F38-490D-4CBB-BEA1-5939BE6DE5BB}"/>
+              </a:ext>
+            </a:extLst>
+          </p:cNvPr>
+          <p:cNvSpPr txBox="1"/>
+          <p:nvPr/>
+        </p:nvSpPr>
+        <p:spPr>
+          <a:xfrm>
+            <a:off x="1277112" y="3773424"/>
+            <a:ext cx="9820656" cy="2308324"/>
+          </a:xfrm>
+          <a:prstGeom prst="rect">
+            <a:avLst/>
+          </a:prstGeom>
+          <a:noFill/>
+        </p:spPr>
+        <p:txBody>
+          <a:bodyPr wrap="square" rtlCol="0">
+            <a:spAutoFit/>
           </a:bodyPr>
           <a:lstStyle/>
           <a:p>
-            <a:pPr marL="342900" indent="-342900" algn="l">
-              <a:buFont typeface="Arial" panose="020B0604020202020204" pitchFamily="34" charset="0"/>
-              <a:buChar char="•"/>
-            </a:pPr>
+            <a:r>
+              <a:rPr lang="it-IT" dirty="0">
+                <a:solidFill>
+                  <a:srgbClr val="FF0000"/>
+                </a:solidFill>
+              </a:rPr>
+              <a:t>PRIMA COSA: </a:t>
+            </a:r>
             <a:r>
               <a:rPr lang="it-IT" dirty="0"/>
-              <a:t>Dimensioni interfaccia? (800x600? Reattiva? Per non sbatterci suggerirei fissa a 800x600)</a:t>
-            </a:r>
-          </a:p>
-          <a:p>
-            <a:pPr marL="342900" indent="-342900" algn="l">
-              <a:buFont typeface="Arial" panose="020B0604020202020204" pitchFamily="34" charset="0"/>
-              <a:buChar char="•"/>
-            </a:pPr>
-            <a:r>
-              <a:rPr lang="en-US" dirty="0" err="1"/>
-              <a:t>Quando</a:t>
-            </a:r>
-            <a:r>
-              <a:rPr lang="en-US" dirty="0"/>
+              <a:t>ho integrato e ripulito il software, quando ci lavorate </a:t>
+            </a:r>
+            <a:r>
+              <a:rPr lang="it-IT" dirty="0" err="1"/>
+              <a:t>ri</a:t>
+            </a:r>
+            <a:r>
+              <a:rPr lang="it-IT" dirty="0"/>
+              <a:t>-scaricatelo tutto da</a:t>
+            </a:r>
+          </a:p>
+          <a:p>
+            <a:endParaRPr lang="it-IT" dirty="0"/>
+          </a:p>
+          <a:p>
+            <a:r>
+              <a:rPr lang="it-IT" dirty="0"/>
               <a:t> </a:t>
             </a:r>
             <a:r>
-              <a:rPr lang="en-US" dirty="0" err="1"/>
-              <a:t>si</a:t>
+              <a:rPr lang="it-IT" dirty="0">
+                <a:hlinkClick r:id="rId2"/>
+              </a:rPr>
+              <a:t>https://github.com/dgasparri/pv-creativity/tree/v2020.01.28-working</a:t>
+            </a:r>
+            <a:endParaRPr lang="it-IT" dirty="0"/>
+          </a:p>
+          <a:p>
+            <a:endParaRPr lang="it-IT" dirty="0"/>
+          </a:p>
+          <a:p>
+            <a:r>
+              <a:rPr lang="en-US" dirty="0"/>
+              <a:t>Se no </a:t>
+            </a:r>
+            <a:r>
+              <a:rPr lang="en-US" dirty="0" err="1"/>
+              <a:t>diventa</a:t>
+            </a:r>
+            <a:r>
+              <a:rPr lang="en-US" dirty="0"/>
+              <a:t> un casino </a:t>
+            </a:r>
+            <a:r>
+              <a:rPr lang="en-US" dirty="0" err="1"/>
+              <a:t>integrarlo</a:t>
+            </a:r>
+            <a:r>
+              <a:rPr lang="en-US" dirty="0"/>
+              <a:t> di nuovo. </a:t>
+            </a:r>
+            <a:r>
+              <a:rPr lang="en-US" dirty="0" err="1"/>
+              <a:t>Attenzione</a:t>
+            </a:r>
+            <a:r>
+              <a:rPr lang="en-US" dirty="0"/>
+              <a:t> a non </a:t>
+            </a:r>
+            <a:r>
+              <a:rPr lang="en-US" dirty="0" err="1"/>
+              <a:t>scaricarsi</a:t>
             </a:r>
             <a:r>
               <a:rPr lang="en-US" dirty="0"/>
@@ -3447,23 +3496,50 @@
             </a:r>
             <a:r>
               <a:rPr lang="en-US" dirty="0" err="1"/>
-              <a:t>schiaccia</a:t>
-            </a:r>
-            <a:r>
-              <a:rPr lang="en-US" dirty="0"/>
-              <a:t> Run, far </a:t>
-            </a:r>
-            <a:r>
-              <a:rPr lang="en-US" dirty="0" err="1"/>
-              <a:t>partire</a:t>
-            </a:r>
-            <a:r>
-              <a:rPr lang="en-US" dirty="0"/>
-              <a:t> una </a:t>
-            </a:r>
-            <a:r>
-              <a:rPr lang="en-US" dirty="0" err="1"/>
-              <a:t>qualche</a:t>
+              <a:t>il</a:t>
+            </a:r>
+            <a:r>
+              <a:rPr lang="en-US" dirty="0"/>
+              <a:t> file di </a:t>
+            </a:r>
+            <a:r>
+              <a:rPr lang="en-US" dirty="0" err="1"/>
+              <a:t>progetto</a:t>
+            </a:r>
+            <a:r>
+              <a:rPr lang="en-US" dirty="0"/>
+              <a:t> di Visual-</a:t>
+            </a:r>
+            <a:r>
+              <a:rPr lang="en-US" dirty="0" err="1"/>
+              <a:t>Schifo</a:t>
+            </a:r>
+            <a:r>
+              <a:rPr lang="en-US" dirty="0"/>
+              <a:t>-Studio 2019, se no non </a:t>
+            </a:r>
+            <a:r>
+              <a:rPr lang="en-US" dirty="0" err="1"/>
+              <a:t>compila</a:t>
+            </a:r>
+            <a:endParaRPr lang="en-US" dirty="0"/>
+          </a:p>
+          <a:p>
+            <a:r>
+              <a:rPr lang="en-US" dirty="0"/>
+              <a:t>(</a:t>
+            </a:r>
+            <a:r>
+              <a:rPr lang="en-US" dirty="0" err="1"/>
+              <a:t>Eventuale</a:t>
+            </a:r>
+            <a:r>
+              <a:rPr lang="en-US" dirty="0"/>
+              <a:t> piano B: </a:t>
+            </a:r>
+            <a:r>
+              <a:rPr lang="en-US" dirty="0" err="1"/>
+              <a:t>tenete</a:t>
             </a:r>
             <a:r>
               <a:rPr lang="en-US" dirty="0"/>
@@ -3471,33 +3547,7 @@
             </a:r>
             <a:r>
               <a:rPr lang="en-US" dirty="0" err="1"/>
-              <a:t>animazione</a:t>
-            </a:r>
-            <a:r>
-              <a:rPr lang="en-US" dirty="0"/>
-              <a:t>.</a:t>
-            </a:r>
-          </a:p>
-          <a:p>
-            <a:pPr marL="800100" lvl="1" indent="-342900" algn="l">
-              <a:buFont typeface="Arial" panose="020B0604020202020204" pitchFamily="34" charset="0"/>
-              <a:buChar char="•"/>
-            </a:pPr>
-            <a:r>
-              <a:rPr lang="en-US" dirty="0"/>
-              <a:t>SE E’ FACILE, </a:t>
-            </a:r>
-            <a:r>
-              <a:rPr lang="en-US" dirty="0" err="1"/>
-              <a:t>il</a:t>
-            </a:r>
-            <a:r>
-              <a:rPr lang="en-US" dirty="0"/>
-              <a:t> sole </a:t>
-            </a:r>
-            <a:r>
-              <a:rPr lang="en-US" dirty="0" err="1"/>
-              <a:t>nel</a:t>
+              <a:t>dettagliata</a:t>
             </a:r>
             <a:r>
               <a:rPr lang="en-US" dirty="0"/>
@@ -3505,22 +3555,23 @@
             </a:r>
             <a:r>
               <a:rPr lang="en-US" dirty="0" err="1"/>
-              <a:t>pannello</a:t>
-            </a:r>
-            <a:endParaRPr lang="en-US" dirty="0"/>
-          </a:p>
-          <a:p>
-            <a:pPr marL="800100" lvl="1" indent="-342900" algn="l">
-              <a:buFont typeface="Arial" panose="020B0604020202020204" pitchFamily="34" charset="0"/>
-              <a:buChar char="•"/>
-            </a:pPr>
-            <a:r>
-              <a:rPr lang="en-US" dirty="0"/>
-              <a:t>SE NON E’ FACILE, far </a:t>
-            </a:r>
-            <a:r>
-              <a:rPr lang="en-US" dirty="0" err="1"/>
-              <a:t>caricare</a:t>
+              <a:t>traccia</a:t>
+            </a:r>
+            <a:r>
+              <a:rPr lang="en-US" dirty="0"/>
+              <a:t> di </a:t>
+            </a:r>
+            <a:r>
+              <a:rPr lang="en-US" dirty="0" err="1"/>
+              <a:t>qualunque</a:t>
+            </a:r>
+            <a:r>
+              <a:rPr lang="en-US" dirty="0"/>
+              <a:t> file </a:t>
+            </a:r>
+            <a:r>
+              <a:rPr lang="en-US" dirty="0" err="1"/>
+              <a:t>modifichiate</a:t>
             </a:r>
             <a:r>
               <a:rPr lang="en-US" dirty="0"/>
@@ -3528,31 +3579,31 @@
             </a:r>
             <a:r>
               <a:rPr lang="en-US" dirty="0" err="1"/>
-              <a:t>ogni</a:t>
-            </a:r>
-            <a:r>
-              <a:rPr lang="en-US" dirty="0"/>
-              <a:t> x loop (</a:t>
-            </a:r>
-            <a:r>
-              <a:rPr lang="en-US" dirty="0" err="1"/>
-              <a:t>tipo</a:t>
-            </a:r>
-            <a:r>
-              <a:rPr lang="en-US" dirty="0"/>
-              <a:t> 10?) una </a:t>
-            </a:r>
-            <a:r>
-              <a:rPr lang="en-US" dirty="0" err="1"/>
-              <a:t>immagine</a:t>
-            </a:r>
-            <a:r>
-              <a:rPr lang="en-US" dirty="0"/>
-              <a:t> jpeg o </a:t>
-            </a:r>
-            <a:r>
-              <a:rPr lang="en-US" dirty="0" err="1"/>
-              <a:t>png</a:t>
+              <a:t>così</a:t>
+            </a:r>
+            <a:r>
+              <a:rPr lang="en-US" dirty="0"/>
+              <a:t> so </a:t>
+            </a:r>
+            <a:r>
+              <a:rPr lang="en-US" dirty="0" err="1"/>
+              <a:t>cosa</a:t>
+            </a:r>
+            <a:r>
+              <a:rPr lang="en-US" dirty="0"/>
+              <a:t> devo </a:t>
+            </a:r>
+            <a:r>
+              <a:rPr lang="en-US" dirty="0" err="1"/>
+              <a:t>scopiazzare</a:t>
+            </a:r>
+            <a:r>
+              <a:rPr lang="en-US" dirty="0"/>
+              <a:t> senza </a:t>
+            </a:r>
+            <a:r>
+              <a:rPr lang="en-US" dirty="0" err="1"/>
+              <a:t>riguardarmi</a:t>
             </a:r>
             <a:r>
               <a:rPr lang="en-US" dirty="0"/>
@@ -3560,239 +3611,59 @@
             </a:r>
             <a:r>
               <a:rPr lang="en-US" dirty="0" err="1"/>
-              <a:t>all’interno</a:t>
-            </a:r>
-            <a:r>
-              <a:rPr lang="en-US" dirty="0"/>
-              <a:t> del box. </a:t>
-            </a:r>
-          </a:p>
-          <a:p>
-            <a:pPr marL="1257300" lvl="2" indent="-342900" algn="l">
-              <a:buFont typeface="Arial" panose="020B0604020202020204" pitchFamily="34" charset="0"/>
-              <a:buChar char="•"/>
-            </a:pPr>
-            <a:r>
-              <a:rPr lang="en-US" dirty="0"/>
-              <a:t>Le </a:t>
-            </a:r>
-            <a:r>
-              <a:rPr lang="en-US" dirty="0" err="1"/>
-              <a:t>immagini</a:t>
-            </a:r>
-            <a:r>
-              <a:rPr lang="en-US" dirty="0"/>
-              <a:t> </a:t>
-            </a:r>
-            <a:r>
-              <a:rPr lang="en-US" dirty="0" err="1"/>
-              <a:t>vengono</a:t>
-            </a:r>
-            <a:r>
-              <a:rPr lang="en-US" dirty="0"/>
-              <a:t> generate da </a:t>
-            </a:r>
-            <a:r>
-              <a:rPr lang="en-US" dirty="0" err="1"/>
-              <a:t>gnuplot</a:t>
-            </a:r>
-            <a:r>
-              <a:rPr lang="en-US" dirty="0"/>
-              <a:t> (</a:t>
-            </a:r>
-            <a:r>
-              <a:rPr lang="en-US" dirty="0" err="1"/>
-              <a:t>src</a:t>
-            </a:r>
-            <a:r>
-              <a:rPr lang="en-US" dirty="0"/>
-              <a:t>/plot/gnuplot.cpp) con </a:t>
-            </a:r>
-            <a:r>
-              <a:rPr lang="en-US" dirty="0" err="1"/>
-              <a:t>il</a:t>
-            </a:r>
-            <a:r>
-              <a:rPr lang="en-US" dirty="0"/>
-              <a:t> </a:t>
-            </a:r>
-            <a:r>
-              <a:rPr lang="en-US" dirty="0" err="1"/>
-              <a:t>grafico</a:t>
-            </a:r>
-            <a:r>
-              <a:rPr lang="en-US" dirty="0"/>
-              <a:t> del </a:t>
-            </a:r>
-            <a:r>
-              <a:rPr lang="en-US" dirty="0" err="1"/>
-              <a:t>rendeimento</a:t>
-            </a:r>
-            <a:r>
-              <a:rPr lang="en-US" dirty="0"/>
-              <a:t> </a:t>
-            </a:r>
-            <a:r>
-              <a:rPr lang="en-US" dirty="0" err="1"/>
-              <a:t>della</a:t>
-            </a:r>
-            <a:r>
-              <a:rPr lang="en-US" dirty="0"/>
-              <a:t> </a:t>
-            </a:r>
-            <a:r>
-              <a:rPr lang="en-US" dirty="0" err="1"/>
-              <a:t>giornata</a:t>
-            </a:r>
-            <a:r>
-              <a:rPr lang="en-US" dirty="0"/>
-              <a:t> </a:t>
-            </a:r>
-            <a:r>
-              <a:rPr lang="en-US" dirty="0" err="1"/>
-              <a:t>tipo</a:t>
-            </a:r>
-            <a:r>
-              <a:rPr lang="en-US" dirty="0"/>
-              <a:t> </a:t>
-            </a:r>
-            <a:r>
-              <a:rPr lang="en-US" dirty="0" err="1"/>
-              <a:t>questo</a:t>
-            </a:r>
-            <a:r>
-              <a:rPr lang="en-US" dirty="0"/>
-              <a:t> qua sotto e </a:t>
-            </a:r>
-            <a:r>
-              <a:rPr lang="en-US" dirty="0" err="1"/>
-              <a:t>salvate</a:t>
-            </a:r>
-            <a:r>
-              <a:rPr lang="en-US" dirty="0"/>
-              <a:t> </a:t>
-            </a:r>
-            <a:r>
-              <a:rPr lang="en-US" dirty="0" err="1"/>
-              <a:t>su</a:t>
-            </a:r>
-            <a:r>
-              <a:rPr lang="en-US" dirty="0"/>
-              <a:t> disco. Di </a:t>
-            </a:r>
-            <a:r>
-              <a:rPr lang="en-US" dirty="0" err="1"/>
-              <a:t>gnuplot</a:t>
-            </a:r>
-            <a:r>
-              <a:rPr lang="en-US" dirty="0"/>
-              <a:t> mi </a:t>
-            </a:r>
-            <a:r>
-              <a:rPr lang="en-US" dirty="0" err="1"/>
-              <a:t>occupo</a:t>
-            </a:r>
-            <a:r>
-              <a:rPr lang="en-US" dirty="0"/>
-              <a:t> </a:t>
-            </a:r>
-            <a:r>
-              <a:rPr lang="en-US" dirty="0" err="1"/>
-              <a:t>io</a:t>
-            </a:r>
-            <a:r>
-              <a:rPr lang="en-US" dirty="0"/>
-              <a:t>, </a:t>
-            </a:r>
-            <a:r>
-              <a:rPr lang="en-US" dirty="0" err="1"/>
-              <a:t>basta</a:t>
-            </a:r>
-            <a:r>
-              <a:rPr lang="en-US" dirty="0"/>
-              <a:t> </a:t>
-            </a:r>
-            <a:r>
-              <a:rPr lang="en-US" dirty="0" err="1"/>
-              <a:t>che</a:t>
-            </a:r>
-            <a:r>
-              <a:rPr lang="en-US" dirty="0"/>
-              <a:t> mi </a:t>
-            </a:r>
-            <a:r>
-              <a:rPr lang="en-US" dirty="0" err="1"/>
-              <a:t>dite</a:t>
-            </a:r>
-            <a:r>
-              <a:rPr lang="en-US" dirty="0"/>
-              <a:t> in </a:t>
-            </a:r>
-            <a:r>
-              <a:rPr lang="en-US" dirty="0" err="1"/>
-              <a:t>che</a:t>
-            </a:r>
-            <a:r>
-              <a:rPr lang="en-US" dirty="0"/>
-              <a:t> </a:t>
-            </a:r>
-            <a:r>
-              <a:rPr lang="en-US" dirty="0" err="1"/>
-              <a:t>dimensioni</a:t>
-            </a:r>
-            <a:r>
-              <a:rPr lang="en-US" dirty="0"/>
-              <a:t> e </a:t>
-            </a:r>
-            <a:r>
-              <a:rPr lang="en-US" dirty="0" err="1"/>
-              <a:t>ogni</a:t>
-            </a:r>
-            <a:r>
-              <a:rPr lang="en-US" dirty="0"/>
-              <a:t> “</a:t>
-            </a:r>
-            <a:r>
-              <a:rPr lang="en-US" dirty="0" err="1"/>
-              <a:t>quanto</a:t>
-            </a:r>
-            <a:r>
-              <a:rPr lang="en-US" dirty="0"/>
-              <a:t>” le </a:t>
-            </a:r>
-            <a:r>
-              <a:rPr lang="en-US" dirty="0" err="1"/>
-              <a:t>volete</a:t>
-            </a:r>
-            <a:r>
-              <a:rPr lang="en-US" dirty="0"/>
-              <a:t> (</a:t>
-            </a:r>
-            <a:r>
-              <a:rPr lang="en-US" dirty="0" err="1"/>
-              <a:t>ogni</a:t>
-            </a:r>
-            <a:r>
-              <a:rPr lang="en-US" dirty="0"/>
-              <a:t> 10 </a:t>
-            </a:r>
-            <a:r>
-              <a:rPr lang="en-US" dirty="0" err="1"/>
-              <a:t>giorni</a:t>
-            </a:r>
-            <a:r>
-              <a:rPr lang="en-US" dirty="0"/>
-              <a:t> di loop?)</a:t>
-            </a:r>
+              <a:t>tutto</a:t>
+            </a:r>
+            <a:r>
+              <a:rPr lang="en-US" dirty="0"/>
+              <a:t>).</a:t>
+            </a:r>
+          </a:p>
+        </p:txBody>
+      </p:sp>
+      <p:sp>
+        <p:nvSpPr>
+          <p:cNvPr id="6" name="TextBox 5">
+            <a:extLst>
+              <a:ext uri="{FF2B5EF4-FFF2-40B4-BE49-F238E27FC236}">
+                <a16:creationId xmlns:a16="http://schemas.microsoft.com/office/drawing/2014/main" id="{452F9596-5722-4B5E-9805-E05ED49EFAA4}"/>
+              </a:ext>
+            </a:extLst>
+          </p:cNvPr>
+          <p:cNvSpPr txBox="1"/>
+          <p:nvPr/>
+        </p:nvSpPr>
+        <p:spPr>
+          <a:xfrm>
+            <a:off x="1572768" y="1737336"/>
+            <a:ext cx="5193792" cy="1569660"/>
+          </a:xfrm>
+          <a:prstGeom prst="rect">
+            <a:avLst/>
+          </a:prstGeom>
+          <a:solidFill>
+            <a:srgbClr val="FF0000"/>
+          </a:solidFill>
+        </p:spPr>
+        <p:txBody>
+          <a:bodyPr wrap="square" rtlCol="0">
+            <a:spAutoFit/>
+          </a:bodyPr>
+          <a:lstStyle/>
+          <a:p>
+            <a:r>
+              <a:rPr lang="it-IT" sz="3200" dirty="0"/>
+              <a:t>ATTENZIONE! Pericolo di morte a lavorare su codice vecchio!! </a:t>
+            </a:r>
+            <a:endParaRPr lang="en-US" sz="3200" dirty="0"/>
           </a:p>
         </p:txBody>
       </p:sp>
       <p:pic>
         <p:nvPicPr>
-          <p:cNvPr id="4" name="Picture 3">
-            <a:extLst>
-              <a:ext uri="{FF2B5EF4-FFF2-40B4-BE49-F238E27FC236}">
-                <a16:creationId xmlns:a16="http://schemas.microsoft.com/office/drawing/2014/main" id="{21088CA0-FB50-427C-9681-ED5A2452D895}"/>
+          <p:cNvPr id="7" name="Picture 6">
+            <a:extLst>
+              <a:ext uri="{FF2B5EF4-FFF2-40B4-BE49-F238E27FC236}">
+                <a16:creationId xmlns:a16="http://schemas.microsoft.com/office/drawing/2014/main" id="{6F8A678F-B4B7-46FE-A72A-5E64F1EC191C}"/>
               </a:ext>
             </a:extLst>
           </p:cNvPr>
@@ -3802,21 +3673,74 @@
           <p:nvPr/>
         </p:nvPicPr>
         <p:blipFill>
-          <a:blip r:embed="rId2"/>
+          <a:blip r:embed="rId3"/>
           <a:stretch>
             <a:fillRect/>
           </a:stretch>
         </p:blipFill>
         <p:spPr>
           <a:xfrm>
-            <a:off x="5834062" y="3891598"/>
-            <a:ext cx="3709797" cy="2773680"/>
+            <a:off x="7046595" y="1466437"/>
+            <a:ext cx="1853565" cy="2118361"/>
           </a:xfrm>
           <a:prstGeom prst="rect">
             <a:avLst/>
           </a:prstGeom>
         </p:spPr>
       </p:pic>
+      <p:sp>
+        <p:nvSpPr>
+          <p:cNvPr id="8" name="TextBox 7">
+            <a:extLst>
+              <a:ext uri="{FF2B5EF4-FFF2-40B4-BE49-F238E27FC236}">
+                <a16:creationId xmlns:a16="http://schemas.microsoft.com/office/drawing/2014/main" id="{BB3493F7-C09A-43BA-A06B-D8CB00E1CFD4}"/>
+              </a:ext>
+            </a:extLst>
+          </p:cNvPr>
+          <p:cNvSpPr txBox="1"/>
+          <p:nvPr/>
+        </p:nvSpPr>
+        <p:spPr>
+          <a:xfrm>
+            <a:off x="1240536" y="6022848"/>
+            <a:ext cx="9893808" cy="1200329"/>
+          </a:xfrm>
+          <a:prstGeom prst="rect">
+            <a:avLst/>
+          </a:prstGeom>
+          <a:noFill/>
+        </p:spPr>
+        <p:txBody>
+          <a:bodyPr wrap="square" rtlCol="0">
+            <a:spAutoFit/>
+          </a:bodyPr>
+          <a:lstStyle/>
+          <a:p>
+            <a:r>
+              <a:rPr lang="it-IT" dirty="0">
+                <a:solidFill>
+                  <a:srgbClr val="FF0000"/>
+                </a:solidFill>
+              </a:rPr>
+              <a:t>Seconda cosa</a:t>
+            </a:r>
+            <a:r>
+              <a:rPr lang="it-IT" dirty="0"/>
+              <a:t>: ho segnato le modifiche in due file, diff-src-fltk-panel_opengl.cpp e diff-src-fltk-PVCReativityUI.cpp, controllate che ci sia tutto e non mi sia perso dietro niente</a:t>
+            </a:r>
+          </a:p>
+          <a:p>
+            <a:endParaRPr lang="it-IT" dirty="0"/>
+          </a:p>
+          <a:p>
+            <a:r>
+              <a:rPr lang="it-IT" dirty="0"/>
+              <a:t> </a:t>
+            </a:r>
+            <a:endParaRPr lang="en-US" dirty="0"/>
+          </a:p>
+        </p:txBody>
+      </p:sp>
     </p:spTree>
     <p:extLst>
       <p:ext uri="{BB962C8B-B14F-4D97-AF65-F5344CB8AC3E}">
@@ -3849,6 +3773,1048 @@
       </p:grpSpPr>
       <p:sp>
         <p:nvSpPr>
+          <p:cNvPr id="2" name="Title 1">
+            <a:extLst>
+              <a:ext uri="{FF2B5EF4-FFF2-40B4-BE49-F238E27FC236}">
+                <a16:creationId xmlns:a16="http://schemas.microsoft.com/office/drawing/2014/main" id="{07DF3CB9-EAE5-4DA2-84FE-8BE53E3C428E}"/>
+              </a:ext>
+            </a:extLst>
+          </p:cNvPr>
+          <p:cNvSpPr>
+            <a:spLocks noGrp="1"/>
+          </p:cNvSpPr>
+          <p:nvPr>
+            <p:ph type="ctrTitle"/>
+          </p:nvPr>
+        </p:nvSpPr>
+        <p:spPr>
+          <a:xfrm>
+            <a:off x="1524000" y="1122363"/>
+            <a:ext cx="6394704" cy="871029"/>
+          </a:xfrm>
+        </p:spPr>
+        <p:txBody>
+          <a:bodyPr>
+            <a:normAutofit fontScale="90000"/>
+          </a:bodyPr>
+          <a:lstStyle/>
+          <a:p>
+            <a:pPr algn="l"/>
+            <a:r>
+              <a:rPr lang="it-IT" dirty="0"/>
+              <a:t>Questioni 2</a:t>
+            </a:r>
+            <a:endParaRPr lang="en-US" dirty="0"/>
+          </a:p>
+        </p:txBody>
+      </p:sp>
+      <p:sp>
+        <p:nvSpPr>
+          <p:cNvPr id="3" name="Subtitle 2">
+            <a:extLst>
+              <a:ext uri="{FF2B5EF4-FFF2-40B4-BE49-F238E27FC236}">
+                <a16:creationId xmlns:a16="http://schemas.microsoft.com/office/drawing/2014/main" id="{7E532D42-5EFB-4F3F-8DB1-D583884E9856}"/>
+              </a:ext>
+            </a:extLst>
+          </p:cNvPr>
+          <p:cNvSpPr>
+            <a:spLocks noGrp="1"/>
+          </p:cNvSpPr>
+          <p:nvPr>
+            <p:ph type="subTitle" idx="1"/>
+          </p:nvPr>
+        </p:nvSpPr>
+        <p:spPr>
+          <a:xfrm>
+            <a:off x="1335024" y="2383508"/>
+            <a:ext cx="9589008" cy="1719100"/>
+          </a:xfrm>
+        </p:spPr>
+        <p:txBody>
+          <a:bodyPr>
+            <a:normAutofit fontScale="70000" lnSpcReduction="20000"/>
+          </a:bodyPr>
+          <a:lstStyle/>
+          <a:p>
+            <a:pPr marL="342900" indent="-342900" algn="l">
+              <a:buFont typeface="Arial" panose="020B0604020202020204" pitchFamily="34" charset="0"/>
+              <a:buChar char="•"/>
+            </a:pPr>
+            <a:r>
+              <a:rPr lang="it-IT" dirty="0"/>
+              <a:t>Dimensioni interfaccia? (800x600? Reattiva? Per non sbatterci suggerirei fissa a 800x600)</a:t>
+            </a:r>
+          </a:p>
+          <a:p>
+            <a:pPr marL="342900" indent="-342900" algn="l">
+              <a:buFont typeface="Arial" panose="020B0604020202020204" pitchFamily="34" charset="0"/>
+              <a:buChar char="•"/>
+            </a:pPr>
+            <a:r>
+              <a:rPr lang="en-US" dirty="0" err="1"/>
+              <a:t>Quando</a:t>
+            </a:r>
+            <a:r>
+              <a:rPr lang="en-US" dirty="0"/>
+              <a:t> </a:t>
+            </a:r>
+            <a:r>
+              <a:rPr lang="en-US" dirty="0" err="1"/>
+              <a:t>si</a:t>
+            </a:r>
+            <a:r>
+              <a:rPr lang="en-US" dirty="0"/>
+              <a:t> </a:t>
+            </a:r>
+            <a:r>
+              <a:rPr lang="en-US" dirty="0" err="1"/>
+              <a:t>schiaccia</a:t>
+            </a:r>
+            <a:r>
+              <a:rPr lang="en-US" dirty="0"/>
+              <a:t> Run, far </a:t>
+            </a:r>
+            <a:r>
+              <a:rPr lang="en-US" dirty="0" err="1"/>
+              <a:t>partire</a:t>
+            </a:r>
+            <a:r>
+              <a:rPr lang="en-US" dirty="0"/>
+              <a:t> una </a:t>
+            </a:r>
+            <a:r>
+              <a:rPr lang="en-US" dirty="0" err="1"/>
+              <a:t>qualche</a:t>
+            </a:r>
+            <a:r>
+              <a:rPr lang="en-US" dirty="0"/>
+              <a:t> </a:t>
+            </a:r>
+            <a:r>
+              <a:rPr lang="en-US" dirty="0" err="1"/>
+              <a:t>animazione</a:t>
+            </a:r>
+            <a:r>
+              <a:rPr lang="en-US" dirty="0"/>
+              <a:t> </a:t>
+            </a:r>
+            <a:r>
+              <a:rPr lang="en-US" dirty="0" err="1"/>
+              <a:t>che</a:t>
+            </a:r>
+            <a:r>
+              <a:rPr lang="en-US" dirty="0"/>
+              <a:t> </a:t>
+            </a:r>
+            <a:r>
+              <a:rPr lang="en-US" dirty="0" err="1"/>
+              <a:t>dia</a:t>
+            </a:r>
+            <a:r>
+              <a:rPr lang="en-US" dirty="0"/>
+              <a:t> un </a:t>
+            </a:r>
+            <a:r>
+              <a:rPr lang="en-US" dirty="0" err="1"/>
+              <a:t>senso</a:t>
+            </a:r>
+            <a:r>
+              <a:rPr lang="en-US" dirty="0"/>
+              <a:t>.</a:t>
+            </a:r>
+          </a:p>
+          <a:p>
+            <a:pPr marL="800100" lvl="1" indent="-342900" algn="l">
+              <a:buFont typeface="Arial" panose="020B0604020202020204" pitchFamily="34" charset="0"/>
+              <a:buChar char="•"/>
+            </a:pPr>
+            <a:r>
+              <a:rPr lang="en-US" dirty="0"/>
+              <a:t>SE E’ FACILE, </a:t>
+            </a:r>
+            <a:r>
+              <a:rPr lang="en-US" dirty="0" err="1"/>
+              <a:t>il</a:t>
+            </a:r>
+            <a:r>
+              <a:rPr lang="en-US" dirty="0"/>
+              <a:t> sole </a:t>
+            </a:r>
+            <a:r>
+              <a:rPr lang="en-US" dirty="0" err="1"/>
+              <a:t>che</a:t>
+            </a:r>
+            <a:r>
+              <a:rPr lang="en-US" dirty="0"/>
+              <a:t> </a:t>
+            </a:r>
+            <a:r>
+              <a:rPr lang="en-US" dirty="0" err="1"/>
+              <a:t>gira</a:t>
+            </a:r>
+            <a:r>
+              <a:rPr lang="en-US" dirty="0"/>
+              <a:t> </a:t>
+            </a:r>
+            <a:r>
+              <a:rPr lang="en-US" dirty="0" err="1"/>
+              <a:t>attorno</a:t>
+            </a:r>
+            <a:r>
+              <a:rPr lang="en-US" dirty="0"/>
+              <a:t> al </a:t>
+            </a:r>
+            <a:r>
+              <a:rPr lang="en-US" dirty="0" err="1"/>
+              <a:t>pannello</a:t>
+            </a:r>
+            <a:endParaRPr lang="en-US" dirty="0"/>
+          </a:p>
+          <a:p>
+            <a:pPr marL="800100" lvl="1" indent="-342900" algn="l">
+              <a:buFont typeface="Arial" panose="020B0604020202020204" pitchFamily="34" charset="0"/>
+              <a:buChar char="•"/>
+            </a:pPr>
+            <a:r>
+              <a:rPr lang="en-US" dirty="0"/>
+              <a:t>SE NON E’ FACILE, far </a:t>
+            </a:r>
+            <a:r>
+              <a:rPr lang="en-US" dirty="0" err="1"/>
+              <a:t>caricare</a:t>
+            </a:r>
+            <a:r>
+              <a:rPr lang="en-US" dirty="0"/>
+              <a:t> </a:t>
+            </a:r>
+            <a:r>
+              <a:rPr lang="en-US" dirty="0" err="1"/>
+              <a:t>ogni</a:t>
+            </a:r>
+            <a:r>
+              <a:rPr lang="en-US" dirty="0"/>
+              <a:t> x loop (</a:t>
+            </a:r>
+            <a:r>
+              <a:rPr lang="en-US" dirty="0" err="1"/>
+              <a:t>tipo</a:t>
+            </a:r>
+            <a:r>
+              <a:rPr lang="en-US" dirty="0"/>
+              <a:t> 10?) una </a:t>
+            </a:r>
+            <a:r>
+              <a:rPr lang="en-US" dirty="0" err="1"/>
+              <a:t>immagine</a:t>
+            </a:r>
+            <a:r>
+              <a:rPr lang="en-US" dirty="0"/>
+              <a:t> jpeg o </a:t>
+            </a:r>
+            <a:r>
+              <a:rPr lang="en-US" dirty="0" err="1"/>
+              <a:t>png</a:t>
+            </a:r>
+            <a:r>
+              <a:rPr lang="en-US" dirty="0"/>
+              <a:t> </a:t>
+            </a:r>
+            <a:r>
+              <a:rPr lang="en-US" dirty="0" err="1"/>
+              <a:t>all’interno</a:t>
+            </a:r>
+            <a:r>
+              <a:rPr lang="en-US" dirty="0"/>
+              <a:t> del box. </a:t>
+            </a:r>
+          </a:p>
+          <a:p>
+            <a:pPr marL="1257300" lvl="2" indent="-342900" algn="l">
+              <a:buFont typeface="Arial" panose="020B0604020202020204" pitchFamily="34" charset="0"/>
+              <a:buChar char="•"/>
+            </a:pPr>
+            <a:r>
+              <a:rPr lang="en-US" dirty="0"/>
+              <a:t>Le </a:t>
+            </a:r>
+            <a:r>
+              <a:rPr lang="en-US" dirty="0" err="1"/>
+              <a:t>immagini</a:t>
+            </a:r>
+            <a:r>
+              <a:rPr lang="en-US" dirty="0"/>
+              <a:t> </a:t>
+            </a:r>
+            <a:r>
+              <a:rPr lang="en-US" dirty="0" err="1"/>
+              <a:t>vengono</a:t>
+            </a:r>
+            <a:r>
+              <a:rPr lang="en-US" dirty="0"/>
+              <a:t> generate da </a:t>
+            </a:r>
+            <a:r>
+              <a:rPr lang="en-US" dirty="0" err="1"/>
+              <a:t>gnuplot</a:t>
+            </a:r>
+            <a:r>
+              <a:rPr lang="en-US" dirty="0"/>
+              <a:t> (</a:t>
+            </a:r>
+            <a:r>
+              <a:rPr lang="en-US" dirty="0" err="1"/>
+              <a:t>src</a:t>
+            </a:r>
+            <a:r>
+              <a:rPr lang="en-US" dirty="0"/>
+              <a:t>/plot/gnuplot.cpp) con </a:t>
+            </a:r>
+            <a:r>
+              <a:rPr lang="en-US" dirty="0" err="1"/>
+              <a:t>il</a:t>
+            </a:r>
+            <a:r>
+              <a:rPr lang="en-US" dirty="0"/>
+              <a:t> </a:t>
+            </a:r>
+            <a:r>
+              <a:rPr lang="en-US" dirty="0" err="1"/>
+              <a:t>grafico</a:t>
+            </a:r>
+            <a:r>
+              <a:rPr lang="en-US" dirty="0"/>
+              <a:t> del </a:t>
+            </a:r>
+            <a:r>
+              <a:rPr lang="en-US" dirty="0" err="1"/>
+              <a:t>rendeimento</a:t>
+            </a:r>
+            <a:r>
+              <a:rPr lang="en-US" dirty="0"/>
+              <a:t> </a:t>
+            </a:r>
+            <a:r>
+              <a:rPr lang="en-US" dirty="0" err="1"/>
+              <a:t>della</a:t>
+            </a:r>
+            <a:r>
+              <a:rPr lang="en-US" dirty="0"/>
+              <a:t> </a:t>
+            </a:r>
+            <a:r>
+              <a:rPr lang="en-US" dirty="0" err="1"/>
+              <a:t>giornata</a:t>
+            </a:r>
+            <a:r>
+              <a:rPr lang="en-US" dirty="0"/>
+              <a:t> </a:t>
+            </a:r>
+            <a:r>
+              <a:rPr lang="en-US" dirty="0" err="1"/>
+              <a:t>tipo</a:t>
+            </a:r>
+            <a:r>
+              <a:rPr lang="en-US" dirty="0"/>
+              <a:t> </a:t>
+            </a:r>
+            <a:r>
+              <a:rPr lang="en-US" dirty="0" err="1"/>
+              <a:t>questo</a:t>
+            </a:r>
+            <a:r>
+              <a:rPr lang="en-US" dirty="0"/>
+              <a:t> qua sotto e </a:t>
+            </a:r>
+            <a:r>
+              <a:rPr lang="en-US" dirty="0" err="1"/>
+              <a:t>salvate</a:t>
+            </a:r>
+            <a:r>
+              <a:rPr lang="en-US" dirty="0"/>
+              <a:t> </a:t>
+            </a:r>
+            <a:r>
+              <a:rPr lang="en-US" dirty="0" err="1"/>
+              <a:t>su</a:t>
+            </a:r>
+            <a:r>
+              <a:rPr lang="en-US" dirty="0"/>
+              <a:t> disco. Di </a:t>
+            </a:r>
+            <a:r>
+              <a:rPr lang="en-US" dirty="0" err="1"/>
+              <a:t>gnuplot</a:t>
+            </a:r>
+            <a:r>
+              <a:rPr lang="en-US" dirty="0"/>
+              <a:t> mi </a:t>
+            </a:r>
+            <a:r>
+              <a:rPr lang="en-US" dirty="0" err="1"/>
+              <a:t>occupo</a:t>
+            </a:r>
+            <a:r>
+              <a:rPr lang="en-US" dirty="0"/>
+              <a:t> </a:t>
+            </a:r>
+            <a:r>
+              <a:rPr lang="en-US" dirty="0" err="1"/>
+              <a:t>io</a:t>
+            </a:r>
+            <a:r>
+              <a:rPr lang="en-US" dirty="0"/>
+              <a:t>, </a:t>
+            </a:r>
+            <a:r>
+              <a:rPr lang="en-US" dirty="0" err="1"/>
+              <a:t>basta</a:t>
+            </a:r>
+            <a:r>
+              <a:rPr lang="en-US" dirty="0"/>
+              <a:t> </a:t>
+            </a:r>
+            <a:r>
+              <a:rPr lang="en-US" dirty="0" err="1"/>
+              <a:t>che</a:t>
+            </a:r>
+            <a:r>
+              <a:rPr lang="en-US" dirty="0"/>
+              <a:t> mi </a:t>
+            </a:r>
+            <a:r>
+              <a:rPr lang="en-US" dirty="0" err="1"/>
+              <a:t>dite</a:t>
+            </a:r>
+            <a:r>
+              <a:rPr lang="en-US" dirty="0"/>
+              <a:t> in </a:t>
+            </a:r>
+            <a:r>
+              <a:rPr lang="en-US" dirty="0" err="1"/>
+              <a:t>che</a:t>
+            </a:r>
+            <a:r>
+              <a:rPr lang="en-US" dirty="0"/>
+              <a:t> </a:t>
+            </a:r>
+            <a:r>
+              <a:rPr lang="en-US" dirty="0" err="1"/>
+              <a:t>dimensioni</a:t>
+            </a:r>
+            <a:r>
+              <a:rPr lang="en-US" dirty="0"/>
+              <a:t> e </a:t>
+            </a:r>
+            <a:r>
+              <a:rPr lang="en-US" dirty="0" err="1"/>
+              <a:t>ogni</a:t>
+            </a:r>
+            <a:r>
+              <a:rPr lang="en-US" dirty="0"/>
+              <a:t> “</a:t>
+            </a:r>
+            <a:r>
+              <a:rPr lang="en-US" dirty="0" err="1"/>
+              <a:t>quanto</a:t>
+            </a:r>
+            <a:r>
+              <a:rPr lang="en-US" dirty="0"/>
+              <a:t>” le </a:t>
+            </a:r>
+            <a:r>
+              <a:rPr lang="en-US" dirty="0" err="1"/>
+              <a:t>volete</a:t>
+            </a:r>
+            <a:r>
+              <a:rPr lang="en-US" dirty="0"/>
+              <a:t> (</a:t>
+            </a:r>
+            <a:r>
+              <a:rPr lang="en-US" dirty="0" err="1"/>
+              <a:t>tipo</a:t>
+            </a:r>
+            <a:r>
+              <a:rPr lang="en-US" dirty="0"/>
+              <a:t> la </a:t>
+            </a:r>
+            <a:r>
+              <a:rPr lang="en-US" dirty="0" err="1"/>
+              <a:t>simulazione</a:t>
+            </a:r>
+            <a:r>
+              <a:rPr lang="en-US" dirty="0"/>
+              <a:t> </a:t>
+            </a:r>
+            <a:r>
+              <a:rPr lang="en-US" dirty="0" err="1"/>
+              <a:t>va</a:t>
+            </a:r>
+            <a:r>
+              <a:rPr lang="en-US" dirty="0"/>
+              <a:t> dal </a:t>
+            </a:r>
+            <a:r>
+              <a:rPr lang="en-US" dirty="0" err="1"/>
+              <a:t>giorno</a:t>
+            </a:r>
+            <a:r>
+              <a:rPr lang="en-US" dirty="0"/>
+              <a:t> 1 al </a:t>
+            </a:r>
+            <a:r>
+              <a:rPr lang="en-US" dirty="0" err="1"/>
+              <a:t>giorno</a:t>
+            </a:r>
+            <a:r>
+              <a:rPr lang="en-US" dirty="0"/>
+              <a:t> 365, </a:t>
+            </a:r>
+            <a:r>
+              <a:rPr lang="en-US" dirty="0" err="1"/>
+              <a:t>facciamo</a:t>
+            </a:r>
+            <a:r>
+              <a:rPr lang="en-US" dirty="0"/>
+              <a:t> </a:t>
+            </a:r>
+            <a:r>
+              <a:rPr lang="en-US" dirty="0" err="1"/>
+              <a:t>ogni</a:t>
+            </a:r>
+            <a:r>
+              <a:rPr lang="en-US" dirty="0"/>
+              <a:t> 10 “</a:t>
+            </a:r>
+            <a:r>
+              <a:rPr lang="en-US" dirty="0" err="1"/>
+              <a:t>giorni</a:t>
+            </a:r>
+            <a:r>
+              <a:rPr lang="en-US" dirty="0"/>
+              <a:t>” </a:t>
+            </a:r>
+            <a:r>
+              <a:rPr lang="en-US" dirty="0" err="1"/>
+              <a:t>si</a:t>
+            </a:r>
+            <a:r>
+              <a:rPr lang="en-US" dirty="0"/>
+              <a:t> </a:t>
+            </a:r>
+            <a:r>
+              <a:rPr lang="en-US" dirty="0" err="1"/>
+              <a:t>carica</a:t>
+            </a:r>
+            <a:r>
+              <a:rPr lang="en-US" dirty="0"/>
+              <a:t> </a:t>
+            </a:r>
+            <a:r>
+              <a:rPr lang="en-US" dirty="0" err="1"/>
+              <a:t>un’immagine</a:t>
+            </a:r>
+            <a:r>
+              <a:rPr lang="en-US" dirty="0"/>
+              <a:t> </a:t>
+            </a:r>
+            <a:r>
+              <a:rPr lang="en-US" dirty="0" err="1"/>
+              <a:t>nuova</a:t>
+            </a:r>
+            <a:r>
+              <a:rPr lang="en-US" dirty="0"/>
+              <a:t>?)</a:t>
+            </a:r>
+          </a:p>
+        </p:txBody>
+      </p:sp>
+      <p:pic>
+        <p:nvPicPr>
+          <p:cNvPr id="4" name="Picture 3">
+            <a:extLst>
+              <a:ext uri="{FF2B5EF4-FFF2-40B4-BE49-F238E27FC236}">
+                <a16:creationId xmlns:a16="http://schemas.microsoft.com/office/drawing/2014/main" id="{21088CA0-FB50-427C-9681-ED5A2452D895}"/>
+              </a:ext>
+            </a:extLst>
+          </p:cNvPr>
+          <p:cNvPicPr>
+            <a:picLocks noChangeAspect="1"/>
+          </p:cNvPicPr>
+          <p:nvPr/>
+        </p:nvPicPr>
+        <p:blipFill>
+          <a:blip r:embed="rId2"/>
+          <a:stretch>
+            <a:fillRect/>
+          </a:stretch>
+        </p:blipFill>
+        <p:spPr>
+          <a:xfrm>
+            <a:off x="6096000" y="4194718"/>
+            <a:ext cx="3051619" cy="2281584"/>
+          </a:xfrm>
+          <a:prstGeom prst="rect">
+            <a:avLst/>
+          </a:prstGeom>
+        </p:spPr>
+      </p:pic>
+    </p:spTree>
+    <p:extLst>
+      <p:ext uri="{BB962C8B-B14F-4D97-AF65-F5344CB8AC3E}">
+        <p14:creationId xmlns:p14="http://schemas.microsoft.com/office/powerpoint/2010/main" val="281743717"/>
+      </p:ext>
+    </p:extLst>
+  </p:cSld>
+  <p:clrMapOvr>
+    <a:masterClrMapping/>
+  </p:clrMapOvr>
+</p:sld>
+</file>
+
+<file path=ppt/slides/slide3.xml><?xml version="1.0" encoding="utf-8"?>
+<p:sld xmlns:a="http://schemas.openxmlformats.org/drawingml/2006/main" xmlns:r="http://schemas.openxmlformats.org/officeDocument/2006/relationships" xmlns:p="http://schemas.openxmlformats.org/presentationml/2006/main">
+  <p:cSld>
+    <p:spTree>
+      <p:nvGrpSpPr>
+        <p:cNvPr id="1" name=""/>
+        <p:cNvGrpSpPr/>
+        <p:nvPr/>
+      </p:nvGrpSpPr>
+      <p:grpSpPr>
+        <a:xfrm>
+          <a:off x="0" y="0"/>
+          <a:ext cx="0" cy="0"/>
+          <a:chOff x="0" y="0"/>
+          <a:chExt cx="0" cy="0"/>
+        </a:xfrm>
+      </p:grpSpPr>
+      <p:sp>
+        <p:nvSpPr>
+          <p:cNvPr id="2" name="Title 1">
+            <a:extLst>
+              <a:ext uri="{FF2B5EF4-FFF2-40B4-BE49-F238E27FC236}">
+                <a16:creationId xmlns:a16="http://schemas.microsoft.com/office/drawing/2014/main" id="{D2008F82-F223-487B-BE76-4FE9881921A6}"/>
+              </a:ext>
+            </a:extLst>
+          </p:cNvPr>
+          <p:cNvSpPr>
+            <a:spLocks noGrp="1"/>
+          </p:cNvSpPr>
+          <p:nvPr>
+            <p:ph type="title"/>
+          </p:nvPr>
+        </p:nvSpPr>
+        <p:spPr/>
+        <p:txBody>
+          <a:bodyPr/>
+          <a:lstStyle/>
+          <a:p>
+            <a:r>
+              <a:rPr lang="it-IT" dirty="0"/>
+              <a:t>Questioni 3</a:t>
+            </a:r>
+            <a:endParaRPr lang="en-US" dirty="0"/>
+          </a:p>
+        </p:txBody>
+      </p:sp>
+      <p:sp>
+        <p:nvSpPr>
+          <p:cNvPr id="3" name="Content Placeholder 2">
+            <a:extLst>
+              <a:ext uri="{FF2B5EF4-FFF2-40B4-BE49-F238E27FC236}">
+                <a16:creationId xmlns:a16="http://schemas.microsoft.com/office/drawing/2014/main" id="{66DA1F76-D217-4927-A8F1-C3B4E4DE9327}"/>
+              </a:ext>
+            </a:extLst>
+          </p:cNvPr>
+          <p:cNvSpPr>
+            <a:spLocks noGrp="1"/>
+          </p:cNvSpPr>
+          <p:nvPr>
+            <p:ph idx="1"/>
+          </p:nvPr>
+        </p:nvSpPr>
+        <p:spPr/>
+        <p:txBody>
+          <a:bodyPr>
+            <a:normAutofit/>
+          </a:bodyPr>
+          <a:lstStyle/>
+          <a:p>
+            <a:r>
+              <a:rPr lang="it-IT" dirty="0"/>
+              <a:t>Warning vari:</a:t>
+            </a:r>
+          </a:p>
+          <a:p>
+            <a:pPr lvl="1"/>
+            <a:r>
+              <a:rPr lang="en-US" sz="1000" dirty="0"/>
+              <a:t>1&gt;Done building project "</a:t>
+            </a:r>
+            <a:r>
+              <a:rPr lang="en-US" sz="1000" dirty="0" err="1"/>
+              <a:t>pv-creativity.vcxproj</a:t>
+            </a:r>
+            <a:r>
+              <a:rPr lang="en-US" sz="1000" dirty="0"/>
+              <a:t>".</a:t>
+            </a:r>
+          </a:p>
+          <a:p>
+            <a:pPr lvl="1"/>
+            <a:r>
+              <a:rPr lang="en-US" sz="1000" dirty="0"/>
+              <a:t>1&gt;</a:t>
+            </a:r>
+          </a:p>
+          <a:p>
+            <a:pPr lvl="1"/>
+            <a:r>
+              <a:rPr lang="en-US" sz="1000" dirty="0"/>
+              <a:t>1&gt;Build succeeded.</a:t>
+            </a:r>
+          </a:p>
+          <a:p>
+            <a:pPr lvl="1"/>
+            <a:r>
+              <a:rPr lang="en-US" sz="1000" dirty="0"/>
+              <a:t>1&gt;</a:t>
+            </a:r>
+          </a:p>
+          <a:p>
+            <a:pPr lvl="1"/>
+            <a:r>
+              <a:rPr lang="en-US" sz="1000" dirty="0"/>
+              <a:t>1&gt;C:\Users\dmg\C++\repos\</a:t>
+            </a:r>
+            <a:r>
+              <a:rPr lang="en-US" sz="1000" dirty="0" err="1"/>
+              <a:t>pv</a:t>
+            </a:r>
+            <a:r>
+              <a:rPr lang="en-US" sz="1000" dirty="0"/>
+              <a:t>-creativity\</a:t>
+            </a:r>
+            <a:r>
+              <a:rPr lang="en-US" sz="1000" dirty="0" err="1"/>
+              <a:t>src</a:t>
+            </a:r>
+            <a:r>
+              <a:rPr lang="en-US" sz="1000" dirty="0"/>
+              <a:t>\</a:t>
+            </a:r>
+            <a:r>
+              <a:rPr lang="en-US" sz="1000" dirty="0" err="1"/>
+              <a:t>fltk</a:t>
+            </a:r>
+            <a:r>
+              <a:rPr lang="en-US" sz="1000" dirty="0"/>
+              <a:t>\panel_opengl.cpp(108,27): warning C4305: 'initializing': truncation from 'double' to 'float'</a:t>
+            </a:r>
+          </a:p>
+          <a:p>
+            <a:pPr lvl="1"/>
+            <a:r>
+              <a:rPr lang="en-US" sz="1000" dirty="0"/>
+              <a:t>1&gt;C:\Users\dmg\C++\repos\</a:t>
+            </a:r>
+            <a:r>
+              <a:rPr lang="en-US" sz="1000" dirty="0" err="1"/>
+              <a:t>pv</a:t>
+            </a:r>
+            <a:r>
+              <a:rPr lang="en-US" sz="1000" dirty="0"/>
+              <a:t>-creativity\</a:t>
+            </a:r>
+            <a:r>
+              <a:rPr lang="en-US" sz="1000" dirty="0" err="1"/>
+              <a:t>src</a:t>
+            </a:r>
+            <a:r>
+              <a:rPr lang="en-US" sz="1000" dirty="0"/>
+              <a:t>\</a:t>
+            </a:r>
+            <a:r>
+              <a:rPr lang="en-US" sz="1000" dirty="0" err="1"/>
+              <a:t>fltk</a:t>
+            </a:r>
+            <a:r>
+              <a:rPr lang="en-US" sz="1000" dirty="0"/>
+              <a:t>\panel_opengl.cpp(115,28): warning C4244: '=': conversion from 'double' to 'float', possible loss of data</a:t>
+            </a:r>
+          </a:p>
+          <a:p>
+            <a:pPr lvl="1"/>
+            <a:r>
+              <a:rPr lang="en-US" sz="1000" dirty="0"/>
+              <a:t>1&gt;C:\Users\dmg\C++\repos\</a:t>
+            </a:r>
+            <a:r>
+              <a:rPr lang="en-US" sz="1000" dirty="0" err="1"/>
+              <a:t>pv</a:t>
+            </a:r>
+            <a:r>
+              <a:rPr lang="en-US" sz="1000" dirty="0"/>
+              <a:t>-creativity\</a:t>
+            </a:r>
+            <a:r>
+              <a:rPr lang="en-US" sz="1000" dirty="0" err="1"/>
+              <a:t>src</a:t>
+            </a:r>
+            <a:r>
+              <a:rPr lang="en-US" sz="1000" dirty="0"/>
+              <a:t>\</a:t>
+            </a:r>
+            <a:r>
+              <a:rPr lang="en-US" sz="1000" dirty="0" err="1"/>
+              <a:t>fltk</a:t>
+            </a:r>
+            <a:r>
+              <a:rPr lang="en-US" sz="1000" dirty="0"/>
+              <a:t>\panel_opengl.cpp(118,31): warning C4244: 'argument': conversion from 'const double' to '</a:t>
+            </a:r>
+            <a:r>
+              <a:rPr lang="en-US" sz="1000" dirty="0" err="1"/>
+              <a:t>GLfloat</a:t>
+            </a:r>
+            <a:r>
+              <a:rPr lang="en-US" sz="1000" dirty="0"/>
+              <a:t>', possible loss of data</a:t>
+            </a:r>
+          </a:p>
+          <a:p>
+            <a:pPr lvl="1"/>
+            <a:r>
+              <a:rPr lang="en-US" sz="1000" dirty="0"/>
+              <a:t>1&gt;C:\Users\dmg\C++\repos\</a:t>
+            </a:r>
+            <a:r>
+              <a:rPr lang="en-US" sz="1000" dirty="0" err="1"/>
+              <a:t>pv</a:t>
+            </a:r>
+            <a:r>
+              <a:rPr lang="en-US" sz="1000" dirty="0"/>
+              <a:t>-creativity\</a:t>
+            </a:r>
+            <a:r>
+              <a:rPr lang="en-US" sz="1000" dirty="0" err="1"/>
+              <a:t>src</a:t>
+            </a:r>
+            <a:r>
+              <a:rPr lang="en-US" sz="1000" dirty="0"/>
+              <a:t>\</a:t>
+            </a:r>
+            <a:r>
+              <a:rPr lang="en-US" sz="1000" dirty="0" err="1"/>
+              <a:t>fltk</a:t>
+            </a:r>
+            <a:r>
+              <a:rPr lang="en-US" sz="1000" dirty="0"/>
+              <a:t>\panel_opengl.cpp(118,25): warning C4244: 'argument': conversion from 'const double' to '</a:t>
+            </a:r>
+            <a:r>
+              <a:rPr lang="en-US" sz="1000" dirty="0" err="1"/>
+              <a:t>GLfloat</a:t>
+            </a:r>
+            <a:r>
+              <a:rPr lang="en-US" sz="1000" dirty="0"/>
+              <a:t>', possible loss of data</a:t>
+            </a:r>
+          </a:p>
+          <a:p>
+            <a:pPr lvl="1"/>
+            <a:r>
+              <a:rPr lang="en-US" sz="1000" dirty="0"/>
+              <a:t>1&gt;C:\Users\dmg\C++\repos\</a:t>
+            </a:r>
+            <a:r>
+              <a:rPr lang="en-US" sz="1000" dirty="0" err="1"/>
+              <a:t>pv</a:t>
+            </a:r>
+            <a:r>
+              <a:rPr lang="en-US" sz="1000" dirty="0"/>
+              <a:t>-creativity\</a:t>
+            </a:r>
+            <a:r>
+              <a:rPr lang="en-US" sz="1000" dirty="0" err="1"/>
+              <a:t>src</a:t>
+            </a:r>
+            <a:r>
+              <a:rPr lang="en-US" sz="1000" dirty="0"/>
+              <a:t>\</a:t>
+            </a:r>
+            <a:r>
+              <a:rPr lang="en-US" sz="1000" dirty="0" err="1"/>
+              <a:t>fltk</a:t>
+            </a:r>
+            <a:r>
+              <a:rPr lang="en-US" sz="1000" dirty="0"/>
+              <a:t>\panel_opengl.cpp(118,19): warning C4244: 'argument': conversion from 'const double' to '</a:t>
+            </a:r>
+            <a:r>
+              <a:rPr lang="en-US" sz="1000" dirty="0" err="1"/>
+              <a:t>GLfloat</a:t>
+            </a:r>
+            <a:r>
+              <a:rPr lang="en-US" sz="1000" dirty="0"/>
+              <a:t>', possible loss of data</a:t>
+            </a:r>
+          </a:p>
+          <a:p>
+            <a:pPr lvl="1"/>
+            <a:r>
+              <a:rPr lang="en-US" sz="1000" dirty="0"/>
+              <a:t>1&gt;C:\Users\dmg\C++\repos\</a:t>
+            </a:r>
+            <a:r>
+              <a:rPr lang="en-US" sz="1000" dirty="0" err="1"/>
+              <a:t>pv</a:t>
+            </a:r>
+            <a:r>
+              <a:rPr lang="en-US" sz="1000" dirty="0"/>
+              <a:t>-creativity\</a:t>
+            </a:r>
+            <a:r>
+              <a:rPr lang="en-US" sz="1000" dirty="0" err="1"/>
+              <a:t>src</a:t>
+            </a:r>
+            <a:r>
+              <a:rPr lang="en-US" sz="1000" dirty="0"/>
+              <a:t>\</a:t>
+            </a:r>
+            <a:r>
+              <a:rPr lang="en-US" sz="1000" dirty="0" err="1"/>
+              <a:t>fltk</a:t>
+            </a:r>
+            <a:r>
+              <a:rPr lang="en-US" sz="1000" dirty="0"/>
+              <a:t>\panel_opengl.cpp(194,18): warning C4244: '=': conversion from 'LONG' to 'float', possible loss of data</a:t>
+            </a:r>
+          </a:p>
+          <a:p>
+            <a:pPr lvl="1"/>
+            <a:r>
+              <a:rPr lang="en-US" sz="1000" dirty="0"/>
+              <a:t>1&gt;C:\Users\dmg\C++\repos\</a:t>
+            </a:r>
+            <a:r>
+              <a:rPr lang="en-US" sz="1000" dirty="0" err="1"/>
+              <a:t>pv</a:t>
+            </a:r>
+            <a:r>
+              <a:rPr lang="en-US" sz="1000" dirty="0"/>
+              <a:t>-creativity\</a:t>
+            </a:r>
+            <a:r>
+              <a:rPr lang="en-US" sz="1000" dirty="0" err="1"/>
+              <a:t>src</a:t>
+            </a:r>
+            <a:r>
+              <a:rPr lang="en-US" sz="1000" dirty="0"/>
+              <a:t>\</a:t>
+            </a:r>
+            <a:r>
+              <a:rPr lang="en-US" sz="1000" dirty="0" err="1"/>
+              <a:t>fltk</a:t>
+            </a:r>
+            <a:r>
+              <a:rPr lang="en-US" sz="1000" dirty="0"/>
+              <a:t>\panel_opengl.cpp(196,18): warning C4244: '=': conversion from 'LONG' to 'float', possible loss of data</a:t>
+            </a:r>
+          </a:p>
+          <a:p>
+            <a:pPr lvl="1"/>
+            <a:r>
+              <a:rPr lang="en-US" sz="1000" dirty="0"/>
+              <a:t>1&gt;C:\Users\dmg\C++\repos\</a:t>
+            </a:r>
+            <a:r>
+              <a:rPr lang="en-US" sz="1000" dirty="0" err="1"/>
+              <a:t>pv</a:t>
+            </a:r>
+            <a:r>
+              <a:rPr lang="en-US" sz="1000" dirty="0"/>
+              <a:t>-creativity\</a:t>
+            </a:r>
+            <a:r>
+              <a:rPr lang="en-US" sz="1000" dirty="0" err="1"/>
+              <a:t>src</a:t>
+            </a:r>
+            <a:r>
+              <a:rPr lang="en-US" sz="1000" dirty="0"/>
+              <a:t>\</a:t>
+            </a:r>
+            <a:r>
+              <a:rPr lang="en-US" sz="1000" dirty="0" err="1"/>
+              <a:t>fltk</a:t>
+            </a:r>
+            <a:r>
+              <a:rPr lang="en-US" sz="1000" dirty="0"/>
+              <a:t>\PVCreativityUI.cpp(49,24): warning C4018: '&lt;': signed/unsigned mismatch</a:t>
+            </a:r>
+          </a:p>
+          <a:p>
+            <a:pPr lvl="1"/>
+            <a:r>
+              <a:rPr lang="en-US" sz="1000" dirty="0"/>
+              <a:t>1&gt;    9 Warning(s)</a:t>
+            </a:r>
+          </a:p>
+          <a:p>
+            <a:pPr lvl="1"/>
+            <a:r>
+              <a:rPr lang="en-US" sz="1000" dirty="0"/>
+              <a:t>1&gt;    0 Error(s)</a:t>
+            </a:r>
+          </a:p>
+          <a:p>
+            <a:pPr lvl="1"/>
+            <a:r>
+              <a:rPr lang="en-US" sz="1000" dirty="0"/>
+              <a:t>1&gt;</a:t>
+            </a:r>
+          </a:p>
+          <a:p>
+            <a:pPr lvl="1"/>
+            <a:r>
+              <a:rPr lang="en-US" sz="1000" dirty="0"/>
+              <a:t>1&gt;Time Elapsed 00:00:11.21</a:t>
+            </a:r>
+          </a:p>
+        </p:txBody>
+      </p:sp>
+    </p:spTree>
+    <p:extLst>
+      <p:ext uri="{BB962C8B-B14F-4D97-AF65-F5344CB8AC3E}">
+        <p14:creationId xmlns:p14="http://schemas.microsoft.com/office/powerpoint/2010/main" val="2729447715"/>
+      </p:ext>
+    </p:extLst>
+  </p:cSld>
+  <p:clrMapOvr>
+    <a:masterClrMapping/>
+  </p:clrMapOvr>
+</p:sld>
+</file>
+
+<file path=ppt/slides/slide4.xml><?xml version="1.0" encoding="utf-8"?>
+<p:sld xmlns:a="http://schemas.openxmlformats.org/drawingml/2006/main" xmlns:r="http://schemas.openxmlformats.org/officeDocument/2006/relationships" xmlns:p="http://schemas.openxmlformats.org/presentationml/2006/main">
+  <p:cSld>
+    <p:spTree>
+      <p:nvGrpSpPr>
+        <p:cNvPr id="1" name=""/>
+        <p:cNvGrpSpPr/>
+        <p:nvPr/>
+      </p:nvGrpSpPr>
+      <p:grpSpPr>
+        <a:xfrm>
+          <a:off x="0" y="0"/>
+          <a:ext cx="0" cy="0"/>
+          <a:chOff x="0" y="0"/>
+          <a:chExt cx="0" cy="0"/>
+        </a:xfrm>
+      </p:grpSpPr>
+      <p:sp>
+        <p:nvSpPr>
           <p:cNvPr id="4" name="CasellaDiTesto 3">
             <a:extLst>
               <a:ext uri="{FF2B5EF4-FFF2-40B4-BE49-F238E27FC236}">
@@ -4401,7 +5367,7 @@
 </p:sld>
 </file>
 
-<file path=ppt/slides/slide3.xml><?xml version="1.0" encoding="utf-8"?>
+<file path=ppt/slides/slide5.xml><?xml version="1.0" encoding="utf-8"?>
 <p:sld xmlns:a="http://schemas.openxmlformats.org/drawingml/2006/main" xmlns:r="http://schemas.openxmlformats.org/officeDocument/2006/relationships" xmlns:p="http://schemas.openxmlformats.org/presentationml/2006/main">
   <p:cSld>
     <p:spTree>
@@ -5182,7 +6148,7 @@
 </p:sld>
 </file>
 
-<file path=ppt/slides/slide4.xml><?xml version="1.0" encoding="utf-8"?>
+<file path=ppt/slides/slide6.xml><?xml version="1.0" encoding="utf-8"?>
 <p:sld xmlns:a="http://schemas.openxmlformats.org/drawingml/2006/main" xmlns:r="http://schemas.openxmlformats.org/officeDocument/2006/relationships" xmlns:p="http://schemas.openxmlformats.org/presentationml/2006/main">
   <p:cSld>
     <p:spTree>

</xml_diff>